<commit_message>
update slide, add examples
</commit_message>
<xml_diff>
--- a/Slide/Introducing Nx lib.pptx
+++ b/Slide/Introducing Nx lib.pptx
@@ -1019,7 +1019,7 @@
       </p:grpSpPr>
       <p:sp>
         <p:nvSpPr>
-          <p:cNvPr id="123" name="Google Shape;123;g2be6d92b5cb_0_45:notes"/>
+          <p:cNvPr id="123" name="Google Shape;123;g2be6d92b5cb_0_50:notes"/>
           <p:cNvSpPr/>
           <p:nvPr>
             <p:ph idx="2" type="sldImg"/>
@@ -1054,7 +1054,7 @@
       </p:sp>
       <p:sp>
         <p:nvSpPr>
-          <p:cNvPr id="124" name="Google Shape;124;g2be6d92b5cb_0_45:notes"/>
+          <p:cNvPr id="124" name="Google Shape;124;g2be6d92b5cb_0_50:notes"/>
           <p:cNvSpPr txBox="1"/>
           <p:nvPr>
             <p:ph idx="1" type="body"/>
@@ -1118,7 +1118,7 @@
       </p:grpSpPr>
       <p:sp>
         <p:nvSpPr>
-          <p:cNvPr id="129" name="Google Shape;129;g2be6d92b5cb_0_50:notes"/>
+          <p:cNvPr id="129" name="Google Shape;129;g2be6d92b5cb_0_55:notes"/>
           <p:cNvSpPr/>
           <p:nvPr>
             <p:ph idx="2" type="sldImg"/>
@@ -1153,7 +1153,7 @@
       </p:sp>
       <p:sp>
         <p:nvSpPr>
-          <p:cNvPr id="130" name="Google Shape;130;g2be6d92b5cb_0_50:notes"/>
+          <p:cNvPr id="130" name="Google Shape;130;g2be6d92b5cb_0_55:notes"/>
           <p:cNvSpPr txBox="1"/>
           <p:nvPr>
             <p:ph idx="1" type="body"/>
@@ -1217,7 +1217,7 @@
       </p:grpSpPr>
       <p:sp>
         <p:nvSpPr>
-          <p:cNvPr id="135" name="Google Shape;135;g2be6d92b5cb_0_55:notes"/>
+          <p:cNvPr id="135" name="Google Shape;135;g2be6d92b5cb_0_61:notes"/>
           <p:cNvSpPr/>
           <p:nvPr>
             <p:ph idx="2" type="sldImg"/>
@@ -1252,7 +1252,7 @@
       </p:sp>
       <p:sp>
         <p:nvSpPr>
-          <p:cNvPr id="136" name="Google Shape;136;g2be6d92b5cb_0_55:notes"/>
+          <p:cNvPr id="136" name="Google Shape;136;g2be6d92b5cb_0_61:notes"/>
           <p:cNvSpPr txBox="1"/>
           <p:nvPr>
             <p:ph idx="1" type="body"/>
@@ -1316,7 +1316,7 @@
       </p:grpSpPr>
       <p:sp>
         <p:nvSpPr>
-          <p:cNvPr id="141" name="Google Shape;141;g2be6d92b5cb_0_61:notes"/>
+          <p:cNvPr id="141" name="Google Shape;141;g2bd0bb568df_0_5:notes"/>
           <p:cNvSpPr/>
           <p:nvPr>
             <p:ph idx="2" type="sldImg"/>
@@ -1351,7 +1351,7 @@
       </p:sp>
       <p:sp>
         <p:nvSpPr>
-          <p:cNvPr id="142" name="Google Shape;142;g2be6d92b5cb_0_61:notes"/>
+          <p:cNvPr id="142" name="Google Shape;142;g2bd0bb568df_0_5:notes"/>
           <p:cNvSpPr txBox="1"/>
           <p:nvPr>
             <p:ph idx="1" type="body"/>
@@ -1415,7 +1415,7 @@
       </p:grpSpPr>
       <p:sp>
         <p:nvSpPr>
-          <p:cNvPr id="147" name="Google Shape;147;g2bd0bb568df_0_5:notes"/>
+          <p:cNvPr id="147" name="Google Shape;147;g2bf1d738883_0_0:notes"/>
           <p:cNvSpPr/>
           <p:nvPr>
             <p:ph idx="2" type="sldImg"/>
@@ -1450,7 +1450,7 @@
       </p:sp>
       <p:sp>
         <p:nvSpPr>
-          <p:cNvPr id="148" name="Google Shape;148;g2bd0bb568df_0_5:notes"/>
+          <p:cNvPr id="148" name="Google Shape;148;g2bf1d738883_0_0:notes"/>
           <p:cNvSpPr txBox="1"/>
           <p:nvPr>
             <p:ph idx="1" type="body"/>
@@ -7624,22 +7624,6 @@
             </a:pPr>
             <a:r>
               <a:rPr lang="en"/>
-              <a:t>Explorer: Creating and manipulating DataFrames (tabular data structures).</a:t>
-            </a:r>
-            <a:endParaRPr/>
-          </a:p>
-          <a:p>
-            <a:pPr indent="0" lvl="0" marL="0" rtl="0" algn="l">
-              <a:spcBef>
-                <a:spcPts val="1200"/>
-              </a:spcBef>
-              <a:spcAft>
-                <a:spcPts val="0"/>
-              </a:spcAft>
-              <a:buNone/>
-            </a:pPr>
-            <a:r>
-              <a:rPr lang="en"/>
               <a:t>Axon: Creating and training neutral networks.</a:t>
             </a:r>
             <a:endParaRPr/>
@@ -7760,7 +7744,7 @@
             </a:pPr>
             <a:r>
               <a:rPr lang="en"/>
-              <a:t>Explorer - Intro</a:t>
+              <a:t>Axon - Intro</a:t>
             </a:r>
             <a:endParaRPr/>
           </a:p>
@@ -7801,23 +7785,7 @@
             </a:pPr>
             <a:r>
               <a:rPr lang="en"/>
-              <a:t>A library for processing data backed by Polars - A </a:t>
-            </a:r>
-            <a:r>
-              <a:rPr lang="en"/>
-              <a:t>famous</a:t>
-            </a:r>
-            <a:r>
-              <a:rPr lang="en"/>
-              <a:t> &amp; blazing fast library (from Rust’s world) for manipulating </a:t>
-            </a:r>
-            <a:r>
-              <a:rPr lang="en"/>
-              <a:t>structured</a:t>
-            </a:r>
-            <a:r>
-              <a:rPr lang="en"/>
-              <a:t> data.</a:t>
+              <a:t>Pure Elixir interface for deep learning.</a:t>
             </a:r>
             <a:endParaRPr/>
           </a:p>
@@ -7834,7 +7802,15 @@
             </a:pPr>
             <a:r>
               <a:rPr lang="en"/>
-              <a:t>Bring Series, Dataframes &amp; data analysis features to Elixir.</a:t>
+              <a:t>Build on top of Nx, don’t need </a:t>
+            </a:r>
+            <a:r>
+              <a:rPr lang="en"/>
+              <a:t>too</a:t>
+            </a:r>
+            <a:r>
+              <a:rPr lang="en"/>
+              <a:t> much work to build &amp; run a neural network.</a:t>
             </a:r>
             <a:endParaRPr/>
           </a:p>
@@ -7851,7 +7827,15 @@
             </a:pPr>
             <a:r>
               <a:rPr lang="en"/>
-              <a:t>Support Parquet, CSV, NDJSON, Arrow IPC formats.</a:t>
+              <a:t>Can run model with ONNX (Open Neural Network Exchange) format </a:t>
+            </a:r>
+            <a:r>
+              <a:rPr lang="en"/>
+              <a:t>through</a:t>
+            </a:r>
+            <a:r>
+              <a:rPr lang="en"/>
+              <a:t> AxonOnnx.</a:t>
             </a:r>
             <a:endParaRPr/>
           </a:p>
@@ -7931,7 +7915,7 @@
             </a:pPr>
             <a:r>
               <a:rPr lang="en"/>
-              <a:t>Axon - Intro</a:t>
+              <a:t>Bumblebee - Intro</a:t>
             </a:r>
             <a:endParaRPr/>
           </a:p>
@@ -7972,7 +7956,15 @@
             </a:pPr>
             <a:r>
               <a:rPr lang="en"/>
-              <a:t>Pure Elixir interface for deep learning.</a:t>
+              <a:t>A </a:t>
+            </a:r>
+            <a:r>
+              <a:rPr lang="en"/>
+              <a:t>wrapper</a:t>
+            </a:r>
+            <a:r>
+              <a:rPr lang="en"/>
+              <a:t> of Axon.</a:t>
             </a:r>
             <a:endParaRPr/>
           </a:p>
@@ -7989,15 +7981,15 @@
             </a:pPr>
             <a:r>
               <a:rPr lang="en"/>
-              <a:t>Build on top of Nx, don’t need </a:t>
-            </a:r>
-            <a:r>
-              <a:rPr lang="en"/>
-              <a:t>too</a:t>
-            </a:r>
-            <a:r>
-              <a:rPr lang="en"/>
-              <a:t> much work to build &amp; run a neural network.</a:t>
+              <a:t>A very </a:t>
+            </a:r>
+            <a:r>
+              <a:rPr lang="en"/>
+              <a:t>convenience</a:t>
+            </a:r>
+            <a:r>
+              <a:rPr lang="en"/>
+              <a:t> library for load &amp; run model from Hugging Face.</a:t>
             </a:r>
             <a:endParaRPr/>
           </a:p>
@@ -8014,30 +8006,7 @@
             </a:pPr>
             <a:r>
               <a:rPr lang="en"/>
-              <a:t>Can run model with ONNX (Open Neural Network Exchange) format </a:t>
-            </a:r>
-            <a:r>
-              <a:rPr lang="en"/>
-              <a:t>through</a:t>
-            </a:r>
-            <a:r>
-              <a:rPr lang="en"/>
-              <a:t> AxonOnnx.</a:t>
-            </a:r>
-            <a:endParaRPr/>
-          </a:p>
-          <a:p>
-            <a:pPr indent="0" lvl="0" marL="457200" rtl="0" algn="l">
-              <a:spcBef>
-                <a:spcPts val="1200"/>
-              </a:spcBef>
-              <a:spcAft>
-                <a:spcPts val="1200"/>
-              </a:spcAft>
-              <a:buNone/>
-            </a:pPr>
-            <a:r>
-              <a:t/>
+              <a:t>Can run on LiveBook.</a:t>
             </a:r>
             <a:endParaRPr/>
           </a:p>
@@ -8102,7 +8071,7 @@
             </a:pPr>
             <a:r>
               <a:rPr lang="en"/>
-              <a:t>Bumblebee - Intro</a:t>
+              <a:t>Demo</a:t>
             </a:r>
             <a:endParaRPr/>
           </a:p>
@@ -8131,69 +8100,18 @@
           </a:bodyPr>
           <a:lstStyle/>
           <a:p>
-            <a:pPr indent="-342900" lvl="0" marL="457200" rtl="0" algn="l">
-              <a:spcBef>
-                <a:spcPts val="0"/>
-              </a:spcBef>
-              <a:spcAft>
-                <a:spcPts val="0"/>
-              </a:spcAft>
-              <a:buSzPts val="1800"/>
-              <a:buChar char="-"/>
-            </a:pPr>
-            <a:r>
-              <a:rPr lang="en"/>
-              <a:t>A </a:t>
-            </a:r>
-            <a:r>
-              <a:rPr lang="en"/>
-              <a:t>wrapper</a:t>
-            </a:r>
-            <a:r>
-              <a:rPr lang="en"/>
-              <a:t> of Axon.</a:t>
-            </a:r>
-            <a:endParaRPr/>
-          </a:p>
-          <a:p>
-            <a:pPr indent="-342900" lvl="0" marL="457200" rtl="0" algn="l">
-              <a:spcBef>
-                <a:spcPts val="0"/>
-              </a:spcBef>
-              <a:spcAft>
-                <a:spcPts val="0"/>
-              </a:spcAft>
-              <a:buSzPts val="1800"/>
-              <a:buChar char="-"/>
-            </a:pPr>
-            <a:r>
-              <a:rPr lang="en"/>
-              <a:t>A very </a:t>
-            </a:r>
-            <a:r>
-              <a:rPr lang="en"/>
-              <a:t>convenience</a:t>
-            </a:r>
-            <a:r>
-              <a:rPr lang="en"/>
-              <a:t> library for load &amp; run model from Hugging Face.</a:t>
-            </a:r>
-            <a:endParaRPr/>
-          </a:p>
-          <a:p>
-            <a:pPr indent="-342900" lvl="0" marL="457200" rtl="0" algn="l">
-              <a:spcBef>
-                <a:spcPts val="0"/>
-              </a:spcBef>
-              <a:spcAft>
-                <a:spcPts val="0"/>
-              </a:spcAft>
-              <a:buSzPts val="1800"/>
-              <a:buChar char="-"/>
-            </a:pPr>
-            <a:r>
-              <a:rPr lang="en"/>
-              <a:t>Can run on LiveBook.</a:t>
+            <a:pPr indent="0" lvl="0" marL="0" rtl="0" algn="l">
+              <a:spcBef>
+                <a:spcPts val="0"/>
+              </a:spcBef>
+              <a:spcAft>
+                <a:spcPts val="1200"/>
+              </a:spcAft>
+              <a:buNone/>
+            </a:pPr>
+            <a:r>
+              <a:rPr lang="en"/>
+              <a:t>Some basic examples for easy understand Nx.</a:t>
             </a:r>
             <a:endParaRPr/>
           </a:p>
@@ -8258,7 +8176,7 @@
             </a:pPr>
             <a:r>
               <a:rPr lang="en"/>
-              <a:t>Demo</a:t>
+              <a:t>Benefits of Nx &amp; libs</a:t>
             </a:r>
             <a:endParaRPr/>
           </a:p>
@@ -8287,18 +8205,74 @@
           </a:bodyPr>
           <a:lstStyle/>
           <a:p>
-            <a:pPr indent="0" lvl="0" marL="0" rtl="0" algn="l">
-              <a:spcBef>
-                <a:spcPts val="0"/>
-              </a:spcBef>
-              <a:spcAft>
-                <a:spcPts val="1200"/>
-              </a:spcAft>
-              <a:buNone/>
-            </a:pPr>
-            <a:r>
-              <a:rPr lang="en"/>
-              <a:t>Some basic examples for easy understand Nx.</a:t>
+            <a:pPr indent="-342900" lvl="0" marL="457200" rtl="0" algn="l">
+              <a:spcBef>
+                <a:spcPts val="0"/>
+              </a:spcBef>
+              <a:spcAft>
+                <a:spcPts val="0"/>
+              </a:spcAft>
+              <a:buSzPts val="1800"/>
+              <a:buChar char="-"/>
+            </a:pPr>
+            <a:r>
+              <a:rPr lang="en"/>
+              <a:t>We don’t need go out to learn other languages/tools to </a:t>
+            </a:r>
+            <a:r>
+              <a:rPr lang="en"/>
+              <a:t>develop data analysis or ML/DL then find a way to integrate it in your app.</a:t>
+            </a:r>
+            <a:endParaRPr/>
+          </a:p>
+          <a:p>
+            <a:pPr indent="-342900" lvl="0" marL="457200" rtl="0" algn="l">
+              <a:spcBef>
+                <a:spcPts val="0"/>
+              </a:spcBef>
+              <a:spcAft>
+                <a:spcPts val="0"/>
+              </a:spcAft>
+              <a:buSzPts val="1800"/>
+              <a:buChar char="-"/>
+            </a:pPr>
+            <a:r>
+              <a:rPr lang="en"/>
+              <a:t>We can run directly inside Elixir app, easy to deploy and reduce latency.</a:t>
+            </a:r>
+            <a:endParaRPr/>
+          </a:p>
+          <a:p>
+            <a:pPr indent="-342900" lvl="0" marL="457200" rtl="0" algn="l">
+              <a:spcBef>
+                <a:spcPts val="0"/>
+              </a:spcBef>
+              <a:spcAft>
+                <a:spcPts val="0"/>
+              </a:spcAft>
+              <a:buSzPts val="1800"/>
+              <a:buChar char="-"/>
+            </a:pPr>
+            <a:r>
+              <a:rPr lang="en"/>
+              <a:t>Save time &amp; resource to develop product.</a:t>
+            </a:r>
+            <a:endParaRPr/>
+          </a:p>
+          <a:p>
+            <a:pPr indent="-342900" lvl="0" marL="457200" rtl="0" algn="l">
+              <a:spcBef>
+                <a:spcPts val="0"/>
+              </a:spcBef>
+              <a:spcAft>
+                <a:spcPts val="0"/>
+              </a:spcAft>
+              <a:buSzPts val="1800"/>
+              <a:buChar char="-"/>
+            </a:pPr>
+            <a:r>
+              <a:rPr lang="en"/>
+              <a:t>Easy to build develop a continuous training system for ML/AL.</a:t>
             </a:r>
             <a:endParaRPr/>
           </a:p>
@@ -8363,7 +8337,15 @@
             </a:pPr>
             <a:r>
               <a:rPr lang="en"/>
-              <a:t>Benefits of Nx &amp; libs</a:t>
+              <a:t>Other </a:t>
+            </a:r>
+            <a:r>
+              <a:rPr lang="en"/>
+              <a:t>libraries</a:t>
+            </a:r>
+            <a:r>
+              <a:rPr lang="en"/>
+              <a:t> for working with Nx</a:t>
             </a:r>
             <a:endParaRPr/>
           </a:p>
@@ -8404,11 +8386,7 @@
             </a:pPr>
             <a:r>
               <a:rPr lang="en"/>
-              <a:t>We don’t need go out to learn other languages/tools to </a:t>
-            </a:r>
-            <a:r>
-              <a:rPr lang="en"/>
-              <a:t>develop data analysis or ML/DL then find a way to integrate it in your app.</a:t>
+              <a:t>Explorer, for ETL (extract, transform, load) task.</a:t>
             </a:r>
             <a:endParaRPr/>
           </a:p>
@@ -8425,41 +8403,7 @@
             </a:pPr>
             <a:r>
               <a:rPr lang="en"/>
-              <a:t>We can run directly inside Elixir app, easy to deploy and reduce latency.</a:t>
-            </a:r>
-            <a:endParaRPr/>
-          </a:p>
-          <a:p>
-            <a:pPr indent="-342900" lvl="0" marL="457200" rtl="0" algn="l">
-              <a:spcBef>
-                <a:spcPts val="0"/>
-              </a:spcBef>
-              <a:spcAft>
-                <a:spcPts val="0"/>
-              </a:spcAft>
-              <a:buSzPts val="1800"/>
-              <a:buChar char="-"/>
-            </a:pPr>
-            <a:r>
-              <a:rPr lang="en"/>
-              <a:t>Save time &amp; resource to develop product.</a:t>
-            </a:r>
-            <a:endParaRPr/>
-          </a:p>
-          <a:p>
-            <a:pPr indent="-342900" lvl="0" marL="457200" rtl="0" algn="l">
-              <a:spcBef>
-                <a:spcPts val="0"/>
-              </a:spcBef>
-              <a:spcAft>
-                <a:spcPts val="0"/>
-              </a:spcAft>
-              <a:buSzPts val="1800"/>
-              <a:buChar char="-"/>
-            </a:pPr>
-            <a:r>
-              <a:rPr lang="en"/>
-              <a:t>Easy to build develop a continuous training system for ML/AL.</a:t>
+              <a:t>Scidata, data samples for study.</a:t>
             </a:r>
             <a:endParaRPr/>
           </a:p>
@@ -9536,6 +9480,23 @@
             <a:r>
               <a:rPr lang="en"/>
               <a:t> data in Elixir.</a:t>
+            </a:r>
+            <a:endParaRPr/>
+          </a:p>
+          <a:p>
+            <a:pPr indent="-342900" lvl="0" marL="457200" rtl="0" algn="l">
+              <a:spcBef>
+                <a:spcPts val="0"/>
+              </a:spcBef>
+              <a:spcAft>
+                <a:spcPts val="0"/>
+              </a:spcAft>
+              <a:buSzPts val="1800"/>
+              <a:buChar char="-"/>
+            </a:pPr>
+            <a:r>
+              <a:rPr lang="en"/>
+              <a:t>Easy to work with matrix &amp; vectors.</a:t>
             </a:r>
             <a:endParaRPr/>
           </a:p>

</xml_diff>

<commit_message>
Update slide & example
</commit_message>
<xml_diff>
--- a/Slide/Introducing Nx lib.pptx
+++ b/Slide/Introducing Nx lib.pptx
@@ -7418,7 +7418,15 @@
             </a:pPr>
             <a:r>
               <a:rPr lang="en"/>
-              <a:t>Computing can run on CPU, GPU, TPU.</a:t>
+              <a:t>Computing run on CPU, GPU, TPU,... Depended backend </a:t>
+            </a:r>
+            <a:r>
+              <a:rPr lang="en"/>
+              <a:t>we used</a:t>
+            </a:r>
+            <a:r>
+              <a:rPr lang="en"/>
+              <a:t>.</a:t>
             </a:r>
             <a:endParaRPr/>
           </a:p>
@@ -7440,7 +7448,7 @@
             <a:endParaRPr/>
           </a:p>
           <a:p>
-            <a:pPr indent="0" lvl="0" marL="457200" rtl="0" algn="l">
+            <a:pPr indent="457200" lvl="0" marL="457200" rtl="0" algn="l">
               <a:spcBef>
                 <a:spcPts val="1200"/>
               </a:spcBef>
@@ -7451,12 +7459,16 @@
             </a:pPr>
             <a:r>
               <a:rPr lang="en"/>
-              <a:t>BinaryBackend, default backend, pure Elixir implementation. Slow but can run everywhere.</a:t>
-            </a:r>
-            <a:endParaRPr/>
-          </a:p>
-          <a:p>
-            <a:pPr indent="0" lvl="0" marL="457200" rtl="0" algn="l">
+              <a:t>- </a:t>
+            </a:r>
+            <a:r>
+              <a:rPr lang="en"/>
+              <a:t>BinaryBackend (default backend), a pure Elixir implementation. Slow but can run everywhere &amp; can validate.</a:t>
+            </a:r>
+            <a:endParaRPr/>
+          </a:p>
+          <a:p>
+            <a:pPr indent="0" lvl="0" marL="914400" rtl="0" algn="l">
               <a:spcBef>
                 <a:spcPts val="1200"/>
               </a:spcBef>
@@ -7467,12 +7479,12 @@
             </a:pPr>
             <a:r>
               <a:rPr lang="en"/>
-              <a:t>EXLA, Elixir client for XLA (from Google).</a:t>
-            </a:r>
-            <a:endParaRPr/>
-          </a:p>
-          <a:p>
-            <a:pPr indent="0" lvl="0" marL="457200" rtl="0" algn="l">
+              <a:t>- EXLA, Elixir client for XLA (Accelerated Linear Algebra - from Google).</a:t>
+            </a:r>
+            <a:endParaRPr/>
+          </a:p>
+          <a:p>
+            <a:pPr indent="0" lvl="0" marL="914400" rtl="0" algn="l">
               <a:spcBef>
                 <a:spcPts val="1200"/>
               </a:spcBef>
@@ -7483,7 +7495,7 @@
             </a:pPr>
             <a:r>
               <a:rPr lang="en"/>
-              <a:t>TorchX, PyTorch Torch Script.</a:t>
+              <a:t>- TorchX, Elixir client for Torch Script (PyTorch, from Meta).</a:t>
             </a:r>
             <a:endParaRPr/>
           </a:p>
@@ -7580,11 +7592,11 @@
             </a:pPr>
             <a:r>
               <a:rPr lang="en"/>
-              <a:t>Nx - Foundation for Data Analysis, ML &amp; </a:t>
-            </a:r>
-            <a:r>
-              <a:rPr lang="en"/>
-              <a:t>Deep Learning</a:t>
+              <a:t>Nx - Foundation for ML &amp; </a:t>
+            </a:r>
+            <a:r>
+              <a:rPr lang="en"/>
+              <a:t>DL</a:t>
             </a:r>
             <a:endParaRPr/>
           </a:p>
@@ -7640,7 +7652,15 @@
             </a:pPr>
             <a:r>
               <a:rPr lang="en"/>
-              <a:t>Scholars: Classic ML.</a:t>
+              <a:t>Scholars: </a:t>
+            </a:r>
+            <a:r>
+              <a:rPr lang="en"/>
+              <a:t>Traditional</a:t>
+            </a:r>
+            <a:r>
+              <a:rPr lang="en"/>
+              <a:t> ML.</a:t>
             </a:r>
             <a:endParaRPr/>
           </a:p>
@@ -7810,7 +7830,7 @@
             </a:r>
             <a:r>
               <a:rPr lang="en"/>
-              <a:t> much work to build &amp; run a neural network.</a:t>
+              <a:t> much work to build &amp; run a model.</a:t>
             </a:r>
             <a:endParaRPr/>
           </a:p>
@@ -8111,7 +8131,23 @@
             </a:pPr>
             <a:r>
               <a:rPr lang="en"/>
-              <a:t>Some basic examples for easy understand Nx.</a:t>
+              <a:t>Some basic examples </a:t>
+            </a:r>
+            <a:r>
+              <a:rPr lang="en"/>
+              <a:t>run on LiveBook </a:t>
+            </a:r>
+            <a:r>
+              <a:rPr lang="en"/>
+              <a:t>for easy understand Nx &amp; </a:t>
+            </a:r>
+            <a:r>
+              <a:rPr lang="en"/>
+              <a:t>libraries</a:t>
+            </a:r>
+            <a:r>
+              <a:rPr lang="en"/>
+              <a:t>.</a:t>
             </a:r>
             <a:endParaRPr/>
           </a:p>
@@ -8221,7 +8257,7 @@
             </a:r>
             <a:r>
               <a:rPr lang="en"/>
-              <a:t>develop data analysis or ML/DL then find a way to integrate it in your app.</a:t>
+              <a:t>develop ML/DL</a:t>
             </a:r>
             <a:endParaRPr/>
           </a:p>
@@ -8238,7 +8274,7 @@
             </a:pPr>
             <a:r>
               <a:rPr lang="en"/>
-              <a:t>We can run directly inside Elixir app, easy to deploy and reduce latency.</a:t>
+              <a:t>We can run directly inside Elixir app and reduce latency.</a:t>
             </a:r>
             <a:endParaRPr/>
           </a:p>
@@ -8255,7 +8291,7 @@
             </a:pPr>
             <a:r>
               <a:rPr lang="en"/>
-              <a:t>Save time &amp; resource to develop product.</a:t>
+              <a:t>Easy to develop, integrate &amp; deploy ML/DL with our Elixir apps.</a:t>
             </a:r>
             <a:endParaRPr/>
           </a:p>
@@ -8272,7 +8308,23 @@
             </a:pPr>
             <a:r>
               <a:rPr lang="en"/>
-              <a:t>Easy to build develop a continuous training system for ML/AL.</a:t>
+              <a:t>Save time &amp; resource to develop product.</a:t>
+            </a:r>
+            <a:endParaRPr/>
+          </a:p>
+          <a:p>
+            <a:pPr indent="0" lvl="0" marL="0" rtl="0" algn="ctr">
+              <a:spcBef>
+                <a:spcPts val="1200"/>
+              </a:spcBef>
+              <a:spcAft>
+                <a:spcPts val="1200"/>
+              </a:spcAft>
+              <a:buNone/>
+            </a:pPr>
+            <a:r>
+              <a:rPr lang="en"/>
+              <a:t> (You can work (solo) from frontend to AI - An advantage stack)</a:t>
             </a:r>
             <a:endParaRPr/>
           </a:p>
@@ -8407,6 +8459,23 @@
             </a:r>
             <a:endParaRPr/>
           </a:p>
+          <a:p>
+            <a:pPr indent="-342900" lvl="0" marL="457200" rtl="0" algn="l">
+              <a:spcBef>
+                <a:spcPts val="0"/>
+              </a:spcBef>
+              <a:spcAft>
+                <a:spcPts val="0"/>
+              </a:spcAft>
+              <a:buSzPts val="1800"/>
+              <a:buChar char="-"/>
+            </a:pPr>
+            <a:r>
+              <a:rPr lang="en"/>
+              <a:t>Evision, a wrapper OpenCV.</a:t>
+            </a:r>
+            <a:endParaRPr/>
+          </a:p>
         </p:txBody>
       </p:sp>
     </p:spTree>
@@ -8838,7 +8907,15 @@
             </a:pPr>
             <a:r>
               <a:rPr lang="en"/>
-              <a:t>Some libraries for working with data &amp; ML/AI.</a:t>
+              <a:t>Some libraries for working with ML/</a:t>
+            </a:r>
+            <a:r>
+              <a:rPr lang="en"/>
+              <a:t>DL</a:t>
+            </a:r>
+            <a:r>
+              <a:rPr lang="en"/>
+              <a:t>.</a:t>
             </a:r>
             <a:endParaRPr/>
           </a:p>
@@ -8855,7 +8932,24 @@
             </a:pPr>
             <a:r>
               <a:rPr lang="en"/>
-              <a:t>Benefits of Nx.</a:t>
+              <a:t>Demo.</a:t>
+            </a:r>
+            <a:endParaRPr/>
+          </a:p>
+          <a:p>
+            <a:pPr indent="-342900" lvl="0" marL="457200" rtl="0" algn="l">
+              <a:spcBef>
+                <a:spcPts val="0"/>
+              </a:spcBef>
+              <a:spcAft>
+                <a:spcPts val="0"/>
+              </a:spcAft>
+              <a:buSzPts val="1800"/>
+              <a:buAutoNum type="arabicPeriod"/>
+            </a:pPr>
+            <a:r>
+              <a:rPr lang="en"/>
+              <a:t>Q &amp; A.</a:t>
             </a:r>
             <a:endParaRPr/>
           </a:p>
@@ -9273,7 +9367,11 @@
             </a:pPr>
             <a:r>
               <a:rPr lang="en"/>
-              <a:t>Rule based detection engine for SoC.</a:t>
+              <a:t>High Performance r</a:t>
+            </a:r>
+            <a:r>
+              <a:rPr lang="en"/>
+              <a:t>ule based detection engine for SoC.</a:t>
             </a:r>
             <a:endParaRPr/>
           </a:p>
@@ -9513,11 +9611,19 @@
             </a:pPr>
             <a:r>
               <a:rPr lang="en"/>
-              <a:t>A foundation for other libraries applied</a:t>
-            </a:r>
-            <a:r>
-              <a:rPr lang="en"/>
-              <a:t> data analysis &amp; ML/DL in Elixir.</a:t>
+              <a:t>A foundation for other libraries to applied</a:t>
+            </a:r>
+            <a:r>
+              <a:rPr lang="en"/>
+              <a:t> </a:t>
+            </a:r>
+            <a:r>
+              <a:rPr lang="en"/>
+              <a:t>Machine Learning/ Deep Learning (</a:t>
+            </a:r>
+            <a:r>
+              <a:rPr lang="en"/>
+              <a:t>ML/DL) to Elixir.</a:t>
             </a:r>
             <a:endParaRPr/>
           </a:p>
@@ -9669,7 +9775,7 @@
             </a:pPr>
             <a:r>
               <a:rPr lang="en"/>
-              <a:t>Tensor hold data in multiple dimensions.</a:t>
+              <a:t>Tensor, a data type in Nx, hold data in multiple dimensions.</a:t>
             </a:r>
             <a:endParaRPr/>
           </a:p>
@@ -9707,7 +9813,7 @@
             </a:r>
             <a:r>
               <a:rPr lang="en"/>
-              <a:t>efn for math expression.</a:t>
+              <a:t>efn for define expression of math formulas.</a:t>
             </a:r>
             <a:endParaRPr/>
           </a:p>
@@ -9724,7 +9830,15 @@
             </a:pPr>
             <a:r>
               <a:rPr lang="en"/>
-              <a:t>Backend, where processing data.</a:t>
+              <a:t>Backend, where </a:t>
+            </a:r>
+            <a:r>
+              <a:rPr lang="en"/>
+              <a:t>data are </a:t>
+            </a:r>
+            <a:r>
+              <a:rPr lang="en"/>
+              <a:t>processing.</a:t>
             </a:r>
             <a:endParaRPr/>
           </a:p>
@@ -9833,7 +9947,7 @@
             </a:r>
             <a:r>
               <a:rPr lang="en"/>
-              <a:t>multidimensional.</a:t>
+              <a:t>multidimensional arrays.</a:t>
             </a:r>
             <a:endParaRPr/>
           </a:p>
@@ -9970,7 +10084,11 @@
             </a:pPr>
             <a:r>
               <a:rPr lang="en"/>
-              <a:t>Tensor operations in Nx</a:t>
+              <a:t>Nx -</a:t>
+            </a:r>
+            <a:r>
+              <a:rPr lang="en"/>
+              <a:t> Operators</a:t>
             </a:r>
             <a:endParaRPr/>
           </a:p>
@@ -9999,18 +10117,44 @@
           </a:bodyPr>
           <a:lstStyle/>
           <a:p>
-            <a:pPr indent="0" lvl="0" marL="0" rtl="0" algn="l">
-              <a:spcBef>
-                <a:spcPts val="0"/>
-              </a:spcBef>
-              <a:spcAft>
-                <a:spcPts val="1200"/>
-              </a:spcAft>
-              <a:buNone/>
-            </a:pPr>
-            <a:r>
-              <a:rPr lang="en"/>
-              <a:t>Operation groups: Aggregating, Window, Cumulative,...  in Nx can understand tensor and run faster than regular Elixir.</a:t>
+            <a:pPr indent="-342900" lvl="0" marL="457200" rtl="0" algn="l">
+              <a:spcBef>
+                <a:spcPts val="0"/>
+              </a:spcBef>
+              <a:spcAft>
+                <a:spcPts val="0"/>
+              </a:spcAft>
+              <a:buSzPts val="1800"/>
+              <a:buChar char="-"/>
+            </a:pPr>
+            <a:r>
+              <a:rPr lang="en"/>
+              <a:t>Operator groups: Aggregating, Window, Cumulative,...</a:t>
+            </a:r>
+            <a:endParaRPr/>
+          </a:p>
+          <a:p>
+            <a:pPr indent="-342900" lvl="0" marL="457200" rtl="0" algn="l">
+              <a:spcBef>
+                <a:spcPts val="0"/>
+              </a:spcBef>
+              <a:spcAft>
+                <a:spcPts val="0"/>
+              </a:spcAft>
+              <a:buSzPts val="1800"/>
+              <a:buChar char="-"/>
+            </a:pPr>
+            <a:r>
+              <a:rPr lang="en"/>
+              <a:t>Nx </a:t>
+            </a:r>
+            <a:r>
+              <a:rPr lang="en"/>
+              <a:t>operators </a:t>
+            </a:r>
+            <a:r>
+              <a:rPr lang="en"/>
+              <a:t>can understand tensor and run faster than regular Elixir.</a:t>
             </a:r>
             <a:endParaRPr/>
           </a:p>
@@ -10245,7 +10389,7 @@
             </a:pPr>
             <a:r>
               <a:rPr lang="en"/>
-              <a:t>A macro to wrap a expression of math formulas.</a:t>
+              <a:t>A macro to wrap an expression of math formulas.</a:t>
             </a:r>
             <a:endParaRPr/>
           </a:p>
@@ -10287,7 +10431,23 @@
             </a:pPr>
             <a:r>
               <a:rPr lang="en"/>
-              <a:t>Tensor ware, replace common operators in Kernel like: ‘Kernel.-/2’ by Nx Operations (optimized for tensors).</a:t>
+              <a:t>Tensor ware, replace common operators in Kernel </a:t>
+            </a:r>
+            <a:r>
+              <a:rPr lang="en"/>
+              <a:t>module (</a:t>
+            </a:r>
+            <a:r>
+              <a:rPr lang="en"/>
+              <a:t>like: ‘Kernel.-/2) by Nx Operat</a:t>
+            </a:r>
+            <a:r>
+              <a:rPr lang="en"/>
+              <a:t>or</a:t>
+            </a:r>
+            <a:r>
+              <a:rPr lang="en"/>
+              <a:t>s (optimized for tensors).</a:t>
             </a:r>
             <a:endParaRPr/>
           </a:p>
@@ -10309,9 +10469,24 @@
             <a:endParaRPr/>
           </a:p>
           <a:p>
+            <a:pPr indent="0" lvl="0" marL="0" rtl="0" algn="l">
+              <a:spcBef>
+                <a:spcPts val="1200"/>
+              </a:spcBef>
+              <a:spcAft>
+                <a:spcPts val="0"/>
+              </a:spcAft>
+              <a:buNone/>
+            </a:pPr>
+            <a:r>
+              <a:t/>
+            </a:r>
+            <a:endParaRPr/>
+          </a:p>
+          <a:p>
             <a:pPr indent="-342900" lvl="0" marL="457200" rtl="0" algn="l">
               <a:spcBef>
-                <a:spcPts val="0"/>
+                <a:spcPts val="1200"/>
               </a:spcBef>
               <a:spcAft>
                 <a:spcPts val="0"/>

</xml_diff>

<commit_message>
update slide & examples
</commit_message>
<xml_diff>
--- a/Slide/Introducing Nx lib.pptx
+++ b/Slide/Introducing Nx lib.pptx
@@ -7830,7 +7830,7 @@
             </a:r>
             <a:r>
               <a:rPr lang="en"/>
-              <a:t> much work to build &amp; run a model.</a:t>
+              <a:t> much work to create, train &amp; run a model.</a:t>
             </a:r>
             <a:endParaRPr/>
           </a:p>
@@ -9792,7 +9792,7 @@
             </a:pPr>
             <a:r>
               <a:rPr lang="en"/>
-              <a:t>Operations for manipulating tensors: Nx.add, Nx.multiply, Nx.sum,...</a:t>
+              <a:t>Operators for manipulating tensors: Nx.add, Nx.multiply, Nx.sum,...</a:t>
             </a:r>
             <a:endParaRPr/>
           </a:p>
@@ -9830,11 +9830,11 @@
             </a:pPr>
             <a:r>
               <a:rPr lang="en"/>
-              <a:t>Backend, where </a:t>
-            </a:r>
-            <a:r>
-              <a:rPr lang="en"/>
-              <a:t>data are </a:t>
+              <a:t>Backend, where for </a:t>
+            </a:r>
+            <a:r>
+              <a:rPr lang="en"/>
+              <a:t>data </a:t>
             </a:r>
             <a:r>
               <a:rPr lang="en"/>
@@ -10526,6 +10526,285 @@
 </file>
 
 <file path=ppt/theme/theme1.xml><?xml version="1.0" encoding="utf-8"?>
+<a:theme xmlns:a="http://schemas.openxmlformats.org/drawingml/2006/main" xmlns:r="http://schemas.openxmlformats.org/officeDocument/2006/relationships" name="Simple Dark">
+  <a:themeElements>
+    <a:clrScheme name="Simple Dark">
+      <a:dk1>
+        <a:srgbClr val="FFFFFF"/>
+      </a:dk1>
+      <a:lt1>
+        <a:srgbClr val="212121"/>
+      </a:lt1>
+      <a:dk2>
+        <a:srgbClr val="303030"/>
+      </a:dk2>
+      <a:lt2>
+        <a:srgbClr val="ADADAD"/>
+      </a:lt2>
+      <a:accent1>
+        <a:srgbClr val="009688"/>
+      </a:accent1>
+      <a:accent2>
+        <a:srgbClr val="EEEEEE"/>
+      </a:accent2>
+      <a:accent3>
+        <a:srgbClr val="78909C"/>
+      </a:accent3>
+      <a:accent4>
+        <a:srgbClr val="FFAB40"/>
+      </a:accent4>
+      <a:accent5>
+        <a:srgbClr val="4DD0E1"/>
+      </a:accent5>
+      <a:accent6>
+        <a:srgbClr val="EEFF41"/>
+      </a:accent6>
+      <a:hlink>
+        <a:srgbClr val="4DD0E1"/>
+      </a:hlink>
+      <a:folHlink>
+        <a:srgbClr val="4DD0E1"/>
+      </a:folHlink>
+    </a:clrScheme>
+    <a:fontScheme name="Office">
+      <a:majorFont>
+        <a:latin typeface="Arial"/>
+        <a:ea typeface=""/>
+        <a:cs typeface=""/>
+        <a:font script="Jpan" typeface="ＭＳ Ｐゴシック"/>
+        <a:font script="Hang" typeface="맑은 고딕"/>
+        <a:font script="Hans" typeface="宋体"/>
+        <a:font script="Hant" typeface="新細明體"/>
+        <a:font script="Arab" typeface="Times New Roman"/>
+        <a:font script="Hebr" typeface="Times New Roman"/>
+        <a:font script="Thai" typeface="Angsana New"/>
+        <a:font script="Ethi" typeface="Nyala"/>
+        <a:font script="Beng" typeface="Vrinda"/>
+        <a:font script="Gujr" typeface="Shruti"/>
+        <a:font script="Khmr" typeface="MoolBoran"/>
+        <a:font script="Knda" typeface="Tunga"/>
+        <a:font script="Guru" typeface="Raavi"/>
+        <a:font script="Cans" typeface="Euphemia"/>
+        <a:font script="Cher" typeface="Plantagenet Cherokee"/>
+        <a:font script="Yiii" typeface="Microsoft Yi Baiti"/>
+        <a:font script="Tibt" typeface="Microsoft Himalaya"/>
+        <a:font script="Thaa" typeface="MV Boli"/>
+        <a:font script="Deva" typeface="Mangal"/>
+        <a:font script="Telu" typeface="Gautami"/>
+        <a:font script="Taml" typeface="Latha"/>
+        <a:font script="Syrc" typeface="Estrangelo Edessa"/>
+        <a:font script="Orya" typeface="Kalinga"/>
+        <a:font script="Mlym" typeface="Kartika"/>
+        <a:font script="Laoo" typeface="DokChampa"/>
+        <a:font script="Sinh" typeface="Iskoola Pota"/>
+        <a:font script="Mong" typeface="Mongolian Baiti"/>
+        <a:font script="Viet" typeface="Times New Roman"/>
+        <a:font script="Uigh" typeface="Microsoft Uighur"/>
+        <a:font script="Geor" typeface="Sylfaen"/>
+      </a:majorFont>
+      <a:minorFont>
+        <a:latin typeface="Arial"/>
+        <a:ea typeface=""/>
+        <a:cs typeface=""/>
+        <a:font script="Jpan" typeface="ＭＳ Ｐゴシック"/>
+        <a:font script="Hang" typeface="맑은 고딕"/>
+        <a:font script="Hans" typeface="宋体"/>
+        <a:font script="Hant" typeface="新細明體"/>
+        <a:font script="Arab" typeface="Arial"/>
+        <a:font script="Hebr" typeface="Arial"/>
+        <a:font script="Thai" typeface="Cordia New"/>
+        <a:font script="Ethi" typeface="Nyala"/>
+        <a:font script="Beng" typeface="Vrinda"/>
+        <a:font script="Gujr" typeface="Shruti"/>
+        <a:font script="Khmr" typeface="DaunPenh"/>
+        <a:font script="Knda" typeface="Tunga"/>
+        <a:font script="Guru" typeface="Raavi"/>
+        <a:font script="Cans" typeface="Euphemia"/>
+        <a:font script="Cher" typeface="Plantagenet Cherokee"/>
+        <a:font script="Yiii" typeface="Microsoft Yi Baiti"/>
+        <a:font script="Tibt" typeface="Microsoft Himalaya"/>
+        <a:font script="Thaa" typeface="MV Boli"/>
+        <a:font script="Deva" typeface="Mangal"/>
+        <a:font script="Telu" typeface="Gautami"/>
+        <a:font script="Taml" typeface="Latha"/>
+        <a:font script="Syrc" typeface="Estrangelo Edessa"/>
+        <a:font script="Orya" typeface="Kalinga"/>
+        <a:font script="Mlym" typeface="Kartika"/>
+        <a:font script="Laoo" typeface="DokChampa"/>
+        <a:font script="Sinh" typeface="Iskoola Pota"/>
+        <a:font script="Mong" typeface="Mongolian Baiti"/>
+        <a:font script="Viet" typeface="Arial"/>
+        <a:font script="Uigh" typeface="Microsoft Uighur"/>
+        <a:font script="Geor" typeface="Sylfaen"/>
+      </a:minorFont>
+    </a:fontScheme>
+    <a:fmtScheme name="Office">
+      <a:fillStyleLst>
+        <a:solidFill>
+          <a:schemeClr val="phClr"/>
+        </a:solidFill>
+        <a:gradFill rotWithShape="1">
+          <a:gsLst>
+            <a:gs pos="0">
+              <a:schemeClr val="phClr">
+                <a:tint val="50000"/>
+                <a:satMod val="300000"/>
+              </a:schemeClr>
+            </a:gs>
+            <a:gs pos="35000">
+              <a:schemeClr val="phClr">
+                <a:tint val="37000"/>
+                <a:satMod val="300000"/>
+              </a:schemeClr>
+            </a:gs>
+            <a:gs pos="100000">
+              <a:schemeClr val="phClr">
+                <a:tint val="15000"/>
+                <a:satMod val="350000"/>
+              </a:schemeClr>
+            </a:gs>
+          </a:gsLst>
+          <a:lin ang="16200000" scaled="1"/>
+        </a:gradFill>
+        <a:gradFill rotWithShape="1">
+          <a:gsLst>
+            <a:gs pos="0">
+              <a:schemeClr val="phClr">
+                <a:tint val="100000"/>
+                <a:shade val="100000"/>
+                <a:satMod val="130000"/>
+              </a:schemeClr>
+            </a:gs>
+            <a:gs pos="100000">
+              <a:schemeClr val="phClr">
+                <a:tint val="50000"/>
+                <a:shade val="100000"/>
+                <a:satMod val="350000"/>
+              </a:schemeClr>
+            </a:gs>
+          </a:gsLst>
+          <a:lin ang="16200000" scaled="0"/>
+        </a:gradFill>
+      </a:fillStyleLst>
+      <a:lnStyleLst>
+        <a:ln w="9525" cap="flat" cmpd="sng" algn="ctr">
+          <a:solidFill>
+            <a:schemeClr val="phClr">
+              <a:shade val="95000"/>
+              <a:satMod val="105000"/>
+            </a:schemeClr>
+          </a:solidFill>
+          <a:prstDash val="solid"/>
+        </a:ln>
+        <a:ln w="25400" cap="flat" cmpd="sng" algn="ctr">
+          <a:solidFill>
+            <a:schemeClr val="phClr"/>
+          </a:solidFill>
+          <a:prstDash val="solid"/>
+        </a:ln>
+        <a:ln w="38100" cap="flat" cmpd="sng" algn="ctr">
+          <a:solidFill>
+            <a:schemeClr val="phClr"/>
+          </a:solidFill>
+          <a:prstDash val="solid"/>
+        </a:ln>
+      </a:lnStyleLst>
+      <a:effectStyleLst>
+        <a:effectStyle>
+          <a:effectLst>
+            <a:outerShdw blurRad="40000" dist="20000" dir="5400000" rotWithShape="0">
+              <a:srgbClr val="000000">
+                <a:alpha val="38000"/>
+              </a:srgbClr>
+            </a:outerShdw>
+          </a:effectLst>
+        </a:effectStyle>
+        <a:effectStyle>
+          <a:effectLst>
+            <a:outerShdw blurRad="40000" dist="23000" dir="5400000" rotWithShape="0">
+              <a:srgbClr val="000000">
+                <a:alpha val="35000"/>
+              </a:srgbClr>
+            </a:outerShdw>
+          </a:effectLst>
+        </a:effectStyle>
+        <a:effectStyle>
+          <a:effectLst>
+            <a:outerShdw blurRad="40000" dist="23000" dir="5400000" rotWithShape="0">
+              <a:srgbClr val="000000">
+                <a:alpha val="35000"/>
+              </a:srgbClr>
+            </a:outerShdw>
+          </a:effectLst>
+          <a:scene3d>
+            <a:camera prst="orthographicFront">
+              <a:rot lat="0" lon="0" rev="0"/>
+            </a:camera>
+            <a:lightRig rig="threePt" dir="t">
+              <a:rot lat="0" lon="0" rev="1200000"/>
+            </a:lightRig>
+          </a:scene3d>
+          <a:sp3d>
+            <a:bevelT w="63500" h="25400"/>
+          </a:sp3d>
+        </a:effectStyle>
+      </a:effectStyleLst>
+      <a:bgFillStyleLst>
+        <a:solidFill>
+          <a:schemeClr val="phClr"/>
+        </a:solidFill>
+        <a:gradFill rotWithShape="1">
+          <a:gsLst>
+            <a:gs pos="0">
+              <a:schemeClr val="phClr">
+                <a:tint val="40000"/>
+                <a:satMod val="350000"/>
+              </a:schemeClr>
+            </a:gs>
+            <a:gs pos="40000">
+              <a:schemeClr val="phClr">
+                <a:tint val="45000"/>
+                <a:shade val="99000"/>
+                <a:satMod val="350000"/>
+              </a:schemeClr>
+            </a:gs>
+            <a:gs pos="100000">
+              <a:schemeClr val="phClr">
+                <a:shade val="20000"/>
+                <a:satMod val="255000"/>
+              </a:schemeClr>
+            </a:gs>
+          </a:gsLst>
+          <a:path path="circle">
+            <a:fillToRect l="50000" t="-80000" r="50000" b="180000"/>
+          </a:path>
+        </a:gradFill>
+        <a:gradFill rotWithShape="1">
+          <a:gsLst>
+            <a:gs pos="0">
+              <a:schemeClr val="phClr">
+                <a:tint val="80000"/>
+                <a:satMod val="300000"/>
+              </a:schemeClr>
+            </a:gs>
+            <a:gs pos="100000">
+              <a:schemeClr val="phClr">
+                <a:shade val="30000"/>
+                <a:satMod val="200000"/>
+              </a:schemeClr>
+            </a:gs>
+          </a:gsLst>
+          <a:path path="circle">
+            <a:fillToRect l="50000" t="50000" r="50000" b="50000"/>
+          </a:path>
+        </a:gradFill>
+      </a:bgFillStyleLst>
+    </a:fmtScheme>
+  </a:themeElements>
+</a:theme>
+</file>
+
+<file path=ppt/theme/theme2.xml><?xml version="1.0" encoding="utf-8"?>
 <a:theme xmlns:a="http://schemas.openxmlformats.org/drawingml/2006/main" xmlns:r="http://schemas.openxmlformats.org/officeDocument/2006/relationships">
   <a:themeElements>
     <a:clrScheme name="Default">
@@ -10802,283 +11081,4 @@
     </a:fmtScheme>
   </a:themeElements>
 </a:theme>
-</file>
-
-<file path=ppt/theme/theme2.xml><?xml version="1.0" encoding="utf-8"?>
-<a:theme xmlns:a="http://schemas.openxmlformats.org/drawingml/2006/main" xmlns:r="http://schemas.openxmlformats.org/officeDocument/2006/relationships" name="Simple Dark">
-  <a:themeElements>
-    <a:clrScheme name="Simple Dark">
-      <a:dk1>
-        <a:srgbClr val="FFFFFF"/>
-      </a:dk1>
-      <a:lt1>
-        <a:srgbClr val="212121"/>
-      </a:lt1>
-      <a:dk2>
-        <a:srgbClr val="303030"/>
-      </a:dk2>
-      <a:lt2>
-        <a:srgbClr val="ADADAD"/>
-      </a:lt2>
-      <a:accent1>
-        <a:srgbClr val="009688"/>
-      </a:accent1>
-      <a:accent2>
-        <a:srgbClr val="EEEEEE"/>
-      </a:accent2>
-      <a:accent3>
-        <a:srgbClr val="78909C"/>
-      </a:accent3>
-      <a:accent4>
-        <a:srgbClr val="FFAB40"/>
-      </a:accent4>
-      <a:accent5>
-        <a:srgbClr val="4DD0E1"/>
-      </a:accent5>
-      <a:accent6>
-        <a:srgbClr val="EEFF41"/>
-      </a:accent6>
-      <a:hlink>
-        <a:srgbClr val="4DD0E1"/>
-      </a:hlink>
-      <a:folHlink>
-        <a:srgbClr val="4DD0E1"/>
-      </a:folHlink>
-    </a:clrScheme>
-    <a:fontScheme name="Office">
-      <a:majorFont>
-        <a:latin typeface="Arial"/>
-        <a:ea typeface=""/>
-        <a:cs typeface=""/>
-        <a:font script="Jpan" typeface="ＭＳ Ｐゴシック"/>
-        <a:font script="Hang" typeface="맑은 고딕"/>
-        <a:font script="Hans" typeface="宋体"/>
-        <a:font script="Hant" typeface="新細明體"/>
-        <a:font script="Arab" typeface="Times New Roman"/>
-        <a:font script="Hebr" typeface="Times New Roman"/>
-        <a:font script="Thai" typeface="Angsana New"/>
-        <a:font script="Ethi" typeface="Nyala"/>
-        <a:font script="Beng" typeface="Vrinda"/>
-        <a:font script="Gujr" typeface="Shruti"/>
-        <a:font script="Khmr" typeface="MoolBoran"/>
-        <a:font script="Knda" typeface="Tunga"/>
-        <a:font script="Guru" typeface="Raavi"/>
-        <a:font script="Cans" typeface="Euphemia"/>
-        <a:font script="Cher" typeface="Plantagenet Cherokee"/>
-        <a:font script="Yiii" typeface="Microsoft Yi Baiti"/>
-        <a:font script="Tibt" typeface="Microsoft Himalaya"/>
-        <a:font script="Thaa" typeface="MV Boli"/>
-        <a:font script="Deva" typeface="Mangal"/>
-        <a:font script="Telu" typeface="Gautami"/>
-        <a:font script="Taml" typeface="Latha"/>
-        <a:font script="Syrc" typeface="Estrangelo Edessa"/>
-        <a:font script="Orya" typeface="Kalinga"/>
-        <a:font script="Mlym" typeface="Kartika"/>
-        <a:font script="Laoo" typeface="DokChampa"/>
-        <a:font script="Sinh" typeface="Iskoola Pota"/>
-        <a:font script="Mong" typeface="Mongolian Baiti"/>
-        <a:font script="Viet" typeface="Times New Roman"/>
-        <a:font script="Uigh" typeface="Microsoft Uighur"/>
-        <a:font script="Geor" typeface="Sylfaen"/>
-      </a:majorFont>
-      <a:minorFont>
-        <a:latin typeface="Arial"/>
-        <a:ea typeface=""/>
-        <a:cs typeface=""/>
-        <a:font script="Jpan" typeface="ＭＳ Ｐゴシック"/>
-        <a:font script="Hang" typeface="맑은 고딕"/>
-        <a:font script="Hans" typeface="宋体"/>
-        <a:font script="Hant" typeface="新細明體"/>
-        <a:font script="Arab" typeface="Arial"/>
-        <a:font script="Hebr" typeface="Arial"/>
-        <a:font script="Thai" typeface="Cordia New"/>
-        <a:font script="Ethi" typeface="Nyala"/>
-        <a:font script="Beng" typeface="Vrinda"/>
-        <a:font script="Gujr" typeface="Shruti"/>
-        <a:font script="Khmr" typeface="DaunPenh"/>
-        <a:font script="Knda" typeface="Tunga"/>
-        <a:font script="Guru" typeface="Raavi"/>
-        <a:font script="Cans" typeface="Euphemia"/>
-        <a:font script="Cher" typeface="Plantagenet Cherokee"/>
-        <a:font script="Yiii" typeface="Microsoft Yi Baiti"/>
-        <a:font script="Tibt" typeface="Microsoft Himalaya"/>
-        <a:font script="Thaa" typeface="MV Boli"/>
-        <a:font script="Deva" typeface="Mangal"/>
-        <a:font script="Telu" typeface="Gautami"/>
-        <a:font script="Taml" typeface="Latha"/>
-        <a:font script="Syrc" typeface="Estrangelo Edessa"/>
-        <a:font script="Orya" typeface="Kalinga"/>
-        <a:font script="Mlym" typeface="Kartika"/>
-        <a:font script="Laoo" typeface="DokChampa"/>
-        <a:font script="Sinh" typeface="Iskoola Pota"/>
-        <a:font script="Mong" typeface="Mongolian Baiti"/>
-        <a:font script="Viet" typeface="Arial"/>
-        <a:font script="Uigh" typeface="Microsoft Uighur"/>
-        <a:font script="Geor" typeface="Sylfaen"/>
-      </a:minorFont>
-    </a:fontScheme>
-    <a:fmtScheme name="Office">
-      <a:fillStyleLst>
-        <a:solidFill>
-          <a:schemeClr val="phClr"/>
-        </a:solidFill>
-        <a:gradFill rotWithShape="1">
-          <a:gsLst>
-            <a:gs pos="0">
-              <a:schemeClr val="phClr">
-                <a:tint val="50000"/>
-                <a:satMod val="300000"/>
-              </a:schemeClr>
-            </a:gs>
-            <a:gs pos="35000">
-              <a:schemeClr val="phClr">
-                <a:tint val="37000"/>
-                <a:satMod val="300000"/>
-              </a:schemeClr>
-            </a:gs>
-            <a:gs pos="100000">
-              <a:schemeClr val="phClr">
-                <a:tint val="15000"/>
-                <a:satMod val="350000"/>
-              </a:schemeClr>
-            </a:gs>
-          </a:gsLst>
-          <a:lin ang="16200000" scaled="1"/>
-        </a:gradFill>
-        <a:gradFill rotWithShape="1">
-          <a:gsLst>
-            <a:gs pos="0">
-              <a:schemeClr val="phClr">
-                <a:tint val="100000"/>
-                <a:shade val="100000"/>
-                <a:satMod val="130000"/>
-              </a:schemeClr>
-            </a:gs>
-            <a:gs pos="100000">
-              <a:schemeClr val="phClr">
-                <a:tint val="50000"/>
-                <a:shade val="100000"/>
-                <a:satMod val="350000"/>
-              </a:schemeClr>
-            </a:gs>
-          </a:gsLst>
-          <a:lin ang="16200000" scaled="0"/>
-        </a:gradFill>
-      </a:fillStyleLst>
-      <a:lnStyleLst>
-        <a:ln w="9525" cap="flat" cmpd="sng" algn="ctr">
-          <a:solidFill>
-            <a:schemeClr val="phClr">
-              <a:shade val="95000"/>
-              <a:satMod val="105000"/>
-            </a:schemeClr>
-          </a:solidFill>
-          <a:prstDash val="solid"/>
-        </a:ln>
-        <a:ln w="25400" cap="flat" cmpd="sng" algn="ctr">
-          <a:solidFill>
-            <a:schemeClr val="phClr"/>
-          </a:solidFill>
-          <a:prstDash val="solid"/>
-        </a:ln>
-        <a:ln w="38100" cap="flat" cmpd="sng" algn="ctr">
-          <a:solidFill>
-            <a:schemeClr val="phClr"/>
-          </a:solidFill>
-          <a:prstDash val="solid"/>
-        </a:ln>
-      </a:lnStyleLst>
-      <a:effectStyleLst>
-        <a:effectStyle>
-          <a:effectLst>
-            <a:outerShdw blurRad="40000" dist="20000" dir="5400000" rotWithShape="0">
-              <a:srgbClr val="000000">
-                <a:alpha val="38000"/>
-              </a:srgbClr>
-            </a:outerShdw>
-          </a:effectLst>
-        </a:effectStyle>
-        <a:effectStyle>
-          <a:effectLst>
-            <a:outerShdw blurRad="40000" dist="23000" dir="5400000" rotWithShape="0">
-              <a:srgbClr val="000000">
-                <a:alpha val="35000"/>
-              </a:srgbClr>
-            </a:outerShdw>
-          </a:effectLst>
-        </a:effectStyle>
-        <a:effectStyle>
-          <a:effectLst>
-            <a:outerShdw blurRad="40000" dist="23000" dir="5400000" rotWithShape="0">
-              <a:srgbClr val="000000">
-                <a:alpha val="35000"/>
-              </a:srgbClr>
-            </a:outerShdw>
-          </a:effectLst>
-          <a:scene3d>
-            <a:camera prst="orthographicFront">
-              <a:rot lat="0" lon="0" rev="0"/>
-            </a:camera>
-            <a:lightRig rig="threePt" dir="t">
-              <a:rot lat="0" lon="0" rev="1200000"/>
-            </a:lightRig>
-          </a:scene3d>
-          <a:sp3d>
-            <a:bevelT w="63500" h="25400"/>
-          </a:sp3d>
-        </a:effectStyle>
-      </a:effectStyleLst>
-      <a:bgFillStyleLst>
-        <a:solidFill>
-          <a:schemeClr val="phClr"/>
-        </a:solidFill>
-        <a:gradFill rotWithShape="1">
-          <a:gsLst>
-            <a:gs pos="0">
-              <a:schemeClr val="phClr">
-                <a:tint val="40000"/>
-                <a:satMod val="350000"/>
-              </a:schemeClr>
-            </a:gs>
-            <a:gs pos="40000">
-              <a:schemeClr val="phClr">
-                <a:tint val="45000"/>
-                <a:shade val="99000"/>
-                <a:satMod val="350000"/>
-              </a:schemeClr>
-            </a:gs>
-            <a:gs pos="100000">
-              <a:schemeClr val="phClr">
-                <a:shade val="20000"/>
-                <a:satMod val="255000"/>
-              </a:schemeClr>
-            </a:gs>
-          </a:gsLst>
-          <a:path path="circle">
-            <a:fillToRect l="50000" t="-80000" r="50000" b="180000"/>
-          </a:path>
-        </a:gradFill>
-        <a:gradFill rotWithShape="1">
-          <a:gsLst>
-            <a:gs pos="0">
-              <a:schemeClr val="phClr">
-                <a:tint val="80000"/>
-                <a:satMod val="300000"/>
-              </a:schemeClr>
-            </a:gs>
-            <a:gs pos="100000">
-              <a:schemeClr val="phClr">
-                <a:shade val="30000"/>
-                <a:satMod val="200000"/>
-              </a:schemeClr>
-            </a:gs>
-          </a:gsLst>
-          <a:path path="circle">
-            <a:fillToRect l="50000" t="50000" r="50000" b="50000"/>
-          </a:path>
-        </a:gradFill>
-      </a:bgFillStyleLst>
-    </a:fmtScheme>
-  </a:themeElements>
-</a:theme>
 </file>
</xml_diff>